<commit_message>
reduction to find max and argmax
</commit_message>
<xml_diff>
--- a/reference/schematics.pptx
+++ b/reference/schematics.pptx
@@ -6,6 +6,7 @@
   </p:sldMasterIdLst>
   <p:sldIdLst>
     <p:sldId id="256" r:id="rId2"/>
+    <p:sldId id="257" r:id="rId3"/>
   </p:sldIdLst>
   <p:sldSz cx="12192000" cy="6858000"/>
   <p:notesSz cx="6858000" cy="9144000"/>
@@ -104,6 +105,11 @@
       </a:defRPr>
     </a:lvl9pPr>
   </p:defaultTextStyle>
+  <p:extLst>
+    <p:ext uri="{EFAFB233-063F-42B5-8137-9DF3F51BA10A}">
+      <p15:sldGuideLst xmlns:p15="http://schemas.microsoft.com/office/powerpoint/2012/main"/>
+    </p:ext>
+  </p:extLst>
 </p:presentation>
 </file>
 
@@ -6670,6 +6676,246 @@
 </p:sld>
 </file>
 
+<file path=ppt/slides/slide2.xml><?xml version="1.0" encoding="utf-8"?>
+<p:sld xmlns:a="http://schemas.openxmlformats.org/drawingml/2006/main" xmlns:r="http://schemas.openxmlformats.org/officeDocument/2006/relationships" xmlns:p="http://schemas.openxmlformats.org/presentationml/2006/main">
+  <p:cSld>
+    <p:spTree>
+      <p:nvGrpSpPr>
+        <p:cNvPr id="1" name=""/>
+        <p:cNvGrpSpPr/>
+        <p:nvPr/>
+      </p:nvGrpSpPr>
+      <p:grpSpPr>
+        <a:xfrm>
+          <a:off x="0" y="0"/>
+          <a:ext cx="0" cy="0"/>
+          <a:chOff x="0" y="0"/>
+          <a:chExt cx="0" cy="0"/>
+        </a:xfrm>
+      </p:grpSpPr>
+      <p:pic>
+        <p:nvPicPr>
+          <p:cNvPr id="5" name="Picture 4">
+            <a:extLst>
+              <a:ext uri="{FF2B5EF4-FFF2-40B4-BE49-F238E27FC236}">
+                <a16:creationId xmlns:a16="http://schemas.microsoft.com/office/drawing/2014/main" id="{564420E0-E8E2-8706-AB4A-2C9651950EDB}"/>
+              </a:ext>
+            </a:extLst>
+          </p:cNvPr>
+          <p:cNvPicPr>
+            <a:picLocks noChangeAspect="1"/>
+          </p:cNvPicPr>
+          <p:nvPr/>
+        </p:nvPicPr>
+        <p:blipFill rotWithShape="1">
+          <a:blip r:embed="rId2">
+            <a:clrChange>
+              <a:clrFrom>
+                <a:srgbClr val="B3B3B3"/>
+              </a:clrFrom>
+              <a:clrTo>
+                <a:srgbClr val="B3B3B3">
+                  <a:alpha val="0"/>
+                </a:srgbClr>
+              </a:clrTo>
+            </a:clrChange>
+          </a:blip>
+          <a:srcRect t="902"/>
+          <a:stretch/>
+        </p:blipFill>
+        <p:spPr>
+          <a:xfrm>
+            <a:off x="1655406" y="1709738"/>
+            <a:ext cx="2459544" cy="2142428"/>
+          </a:xfrm>
+          <a:prstGeom prst="rect">
+            <a:avLst/>
+          </a:prstGeom>
+        </p:spPr>
+      </p:pic>
+      <p:pic>
+        <p:nvPicPr>
+          <p:cNvPr id="6" name="Picture 5">
+            <a:extLst>
+              <a:ext uri="{FF2B5EF4-FFF2-40B4-BE49-F238E27FC236}">
+                <a16:creationId xmlns:a16="http://schemas.microsoft.com/office/drawing/2014/main" id="{058D77DC-4674-1915-34C8-BE5697ACA282}"/>
+              </a:ext>
+            </a:extLst>
+          </p:cNvPr>
+          <p:cNvPicPr>
+            <a:picLocks noChangeAspect="1"/>
+          </p:cNvPicPr>
+          <p:nvPr/>
+        </p:nvPicPr>
+        <p:blipFill>
+          <a:blip r:embed="rId3">
+            <a:clrChange>
+              <a:clrFrom>
+                <a:srgbClr val="AAAAAA"/>
+              </a:clrFrom>
+              <a:clrTo>
+                <a:srgbClr val="AAAAAA">
+                  <a:alpha val="0"/>
+                </a:srgbClr>
+              </a:clrTo>
+            </a:clrChange>
+            <a:extLst>
+              <a:ext uri="{28A0092B-C50C-407E-A947-70E740481C1C}">
+                <a14:useLocalDpi xmlns:a14="http://schemas.microsoft.com/office/drawing/2010/main" val="0"/>
+              </a:ext>
+            </a:extLst>
+          </a:blip>
+          <a:stretch>
+            <a:fillRect/>
+          </a:stretch>
+        </p:blipFill>
+        <p:spPr>
+          <a:xfrm>
+            <a:off x="4114950" y="1586849"/>
+            <a:ext cx="4441797" cy="2265317"/>
+          </a:xfrm>
+          <a:prstGeom prst="rect">
+            <a:avLst/>
+          </a:prstGeom>
+          <a:ln>
+            <a:noFill/>
+          </a:ln>
+          <a:effectLst>
+            <a:outerShdw blurRad="292100" dist="139700" dir="2700000" algn="tl" rotWithShape="0">
+              <a:srgbClr val="333333">
+                <a:alpha val="65000"/>
+              </a:srgbClr>
+            </a:outerShdw>
+          </a:effectLst>
+        </p:spPr>
+      </p:pic>
+      <p:sp>
+        <p:nvSpPr>
+          <p:cNvPr id="8" name="Cross 7">
+            <a:extLst>
+              <a:ext uri="{FF2B5EF4-FFF2-40B4-BE49-F238E27FC236}">
+                <a16:creationId xmlns:a16="http://schemas.microsoft.com/office/drawing/2014/main" id="{035861B4-2402-1C95-22C7-E76B91475D22}"/>
+              </a:ext>
+            </a:extLst>
+          </p:cNvPr>
+          <p:cNvSpPr/>
+          <p:nvPr/>
+        </p:nvSpPr>
+        <p:spPr>
+          <a:xfrm>
+            <a:off x="2971800" y="2648069"/>
+            <a:ext cx="71438" cy="71438"/>
+          </a:xfrm>
+          <a:prstGeom prst="plus">
+            <a:avLst>
+              <a:gd name="adj" fmla="val 41667"/>
+            </a:avLst>
+          </a:prstGeom>
+          <a:ln>
+            <a:solidFill>
+              <a:srgbClr val="FF0000"/>
+            </a:solidFill>
+          </a:ln>
+        </p:spPr>
+        <p:style>
+          <a:lnRef idx="2">
+            <a:schemeClr val="accent1">
+              <a:shade val="15000"/>
+            </a:schemeClr>
+          </a:lnRef>
+          <a:fillRef idx="1">
+            <a:schemeClr val="accent1"/>
+          </a:fillRef>
+          <a:effectRef idx="0">
+            <a:schemeClr val="accent1"/>
+          </a:effectRef>
+          <a:fontRef idx="minor">
+            <a:schemeClr val="lt1"/>
+          </a:fontRef>
+        </p:style>
+        <p:txBody>
+          <a:bodyPr rtlCol="0" anchor="ctr"/>
+          <a:lstStyle/>
+          <a:p>
+            <a:pPr algn="ctr"/>
+            <a:endParaRPr lang="en-US"/>
+          </a:p>
+        </p:txBody>
+      </p:sp>
+      <p:sp>
+        <p:nvSpPr>
+          <p:cNvPr id="9" name="TextBox 8">
+            <a:extLst>
+              <a:ext uri="{FF2B5EF4-FFF2-40B4-BE49-F238E27FC236}">
+                <a16:creationId xmlns:a16="http://schemas.microsoft.com/office/drawing/2014/main" id="{DF6B1C50-C575-3307-7C9D-65B5F665DF31}"/>
+              </a:ext>
+            </a:extLst>
+          </p:cNvPr>
+          <p:cNvSpPr txBox="1"/>
+          <p:nvPr/>
+        </p:nvSpPr>
+        <p:spPr>
+          <a:xfrm>
+            <a:off x="7258050" y="1838325"/>
+            <a:ext cx="1043876" cy="430887"/>
+          </a:xfrm>
+          <a:prstGeom prst="rect">
+            <a:avLst/>
+          </a:prstGeom>
+          <a:noFill/>
+        </p:spPr>
+        <p:txBody>
+          <a:bodyPr wrap="none" rtlCol="0">
+            <a:spAutoFit/>
+          </a:bodyPr>
+          <a:lstStyle/>
+          <a:p>
+            <a:r>
+              <a:rPr lang="en-US" sz="1100" dirty="0">
+                <a:solidFill>
+                  <a:srgbClr val="FF0000"/>
+                </a:solidFill>
+              </a:rPr>
+              <a:t>---</a:t>
+            </a:r>
+            <a:r>
+              <a:rPr lang="en-US" sz="1100" dirty="0"/>
+              <a:t> </a:t>
+            </a:r>
+            <a:r>
+              <a:rPr lang="en-US" sz="1100" dirty="0">
+                <a:solidFill>
+                  <a:schemeClr val="bg1"/>
+                </a:solidFill>
+              </a:rPr>
+              <a:t>theory</a:t>
+            </a:r>
+          </a:p>
+          <a:p>
+            <a:r>
+              <a:rPr lang="en-US" sz="1100" dirty="0">
+                <a:solidFill>
+                  <a:schemeClr val="bg1"/>
+                </a:solidFill>
+              </a:rPr>
+              <a:t>--- experiment</a:t>
+            </a:r>
+          </a:p>
+        </p:txBody>
+      </p:sp>
+    </p:spTree>
+    <p:extLst>
+      <p:ext uri="{BB962C8B-B14F-4D97-AF65-F5344CB8AC3E}">
+        <p14:creationId xmlns:p14="http://schemas.microsoft.com/office/powerpoint/2010/main" val="3052180879"/>
+      </p:ext>
+    </p:extLst>
+  </p:cSld>
+  <p:clrMapOvr>
+    <a:masterClrMapping/>
+  </p:clrMapOvr>
+</p:sld>
+</file>
+
 <file path=ppt/theme/theme1.xml><?xml version="1.0" encoding="utf-8"?>
 <a:theme xmlns:a="http://schemas.openxmlformats.org/drawingml/2006/main" name="Office Theme">
   <a:themeElements>

</xml_diff>